<commit_message>
officeaddins m5 - fy19q3 quarterly refresh
- added copyright to edited files
- updated slides & code samples to work against all current deps
</commit_message>
<xml_diff>
--- a/OfficeAddin/05 Using modern JavaScript/01 Build an Office Add-in using React.pptx
+++ b/OfficeAddin/05 Using modern JavaScript/01 Build an Office Add-in using React.pptx
@@ -265,7 +265,7 @@
               <a:rPr lang="en-US" smtClean="0">
                 <a:latin typeface="Segoe UI" pitchFamily="34" charset="0"/>
               </a:rPr>
-              <a:t>9/17/18 8:50 PM</a:t>
+              <a:t>3/4/19 8:32 PM</a:t>
             </a:fld>
             <a:endParaRPr lang="en-US" dirty="0">
               <a:latin typeface="Segoe UI" pitchFamily="34" charset="0"/>
@@ -559,7 +559,7 @@
           <a:p>
             <a:fld id="{D18B56EA-E28F-4F92-9F16-7A6F2501B303}" type="datetime8">
               <a:rPr lang="en-US" smtClean="0"/>
-              <a:t>9/17/18 8:50 PM</a:t>
+              <a:t>3/4/19 8:32 PM</a:t>
             </a:fld>
             <a:endParaRPr lang="en-US" dirty="0"/>
           </a:p>
@@ -1047,7 +1047,7 @@
                 <a:tabLst/>
                 <a:defRPr/>
               </a:pPr>
-              <a:t>9/17/18 8:50 PM</a:t>
+              <a:t>3/4/19 8:32 PM</a:t>
             </a:fld>
             <a:endParaRPr kumimoji="0" lang="en-US" sz="1200" b="0" i="0" u="none" strike="noStrike" kern="1200" cap="none" spc="0" normalizeH="0" baseline="0" noProof="0" dirty="0">
               <a:ln>
@@ -1300,7 +1300,7 @@
           <a:p>
             <a:fld id="{D18B56EA-E28F-4F92-9F16-7A6F2501B303}" type="datetime8">
               <a:rPr lang="en-US" smtClean="0"/>
-              <a:t>9/17/18 8:50 PM</a:t>
+              <a:t>3/4/19 8:32 PM</a:t>
             </a:fld>
             <a:endParaRPr lang="en-US" dirty="0"/>
           </a:p>
@@ -1481,7 +1481,7 @@
           <a:p>
             <a:fld id="{D18B56EA-E28F-4F92-9F16-7A6F2501B303}" type="datetime8">
               <a:rPr lang="en-US" smtClean="0"/>
-              <a:t>9/17/18 8:50 PM</a:t>
+              <a:t>3/4/19 8:32 PM</a:t>
             </a:fld>
             <a:endParaRPr lang="en-US" dirty="0"/>
           </a:p>
@@ -1662,7 +1662,7 @@
           <a:p>
             <a:fld id="{D18B56EA-E28F-4F92-9F16-7A6F2501B303}" type="datetime8">
               <a:rPr lang="en-US" smtClean="0"/>
-              <a:t>9/17/18 8:50 PM</a:t>
+              <a:t>3/4/19 8:32 PM</a:t>
             </a:fld>
             <a:endParaRPr lang="en-US" dirty="0"/>
           </a:p>
@@ -1948,7 +1948,7 @@
                 <a:tabLst/>
                 <a:defRPr/>
               </a:pPr>
-              <a:t>9/17/18 8:50 PM</a:t>
+              <a:t>3/4/19 8:32 PM</a:t>
             </a:fld>
             <a:endParaRPr kumimoji="0" lang="en-US" sz="1200" b="0" i="0" u="none" strike="noStrike" kern="1200" cap="none" spc="0" normalizeH="0" baseline="0" noProof="0" dirty="0">
               <a:ln>
@@ -2226,7 +2226,7 @@
           <a:p>
             <a:fld id="{D18B56EA-E28F-4F92-9F16-7A6F2501B303}" type="datetime8">
               <a:rPr lang="en-US" smtClean="0"/>
-              <a:t>9/17/18 8:50 PM</a:t>
+              <a:t>3/4/19 8:32 PM</a:t>
             </a:fld>
             <a:endParaRPr lang="en-US" dirty="0"/>
           </a:p>
@@ -2489,7 +2489,7 @@
           <a:p>
             <a:fld id="{D18B56EA-E28F-4F92-9F16-7A6F2501B303}" type="datetime8">
               <a:rPr lang="en-US" smtClean="0"/>
-              <a:t>9/17/18 8:50 PM</a:t>
+              <a:t>3/4/19 8:32 PM</a:t>
             </a:fld>
             <a:endParaRPr lang="en-US" dirty="0"/>
           </a:p>
@@ -2728,7 +2728,7 @@
           <a:p>
             <a:fld id="{D18B56EA-E28F-4F92-9F16-7A6F2501B303}" type="datetime8">
               <a:rPr lang="en-US" smtClean="0"/>
-              <a:t>9/17/18 8:50 PM</a:t>
+              <a:t>3/4/19 8:32 PM</a:t>
             </a:fld>
             <a:endParaRPr lang="en-US" dirty="0"/>
           </a:p>
@@ -2950,7 +2950,7 @@
           <a:p>
             <a:fld id="{D18B56EA-E28F-4F92-9F16-7A6F2501B303}" type="datetime8">
               <a:rPr lang="en-US" smtClean="0"/>
-              <a:t>9/17/18 8:50 PM</a:t>
+              <a:t>3/4/19 8:32 PM</a:t>
             </a:fld>
             <a:endParaRPr lang="en-US" dirty="0"/>
           </a:p>
@@ -3155,7 +3155,7 @@
           <a:p>
             <a:fld id="{D18B56EA-E28F-4F92-9F16-7A6F2501B303}" type="datetime8">
               <a:rPr lang="en-US" smtClean="0"/>
-              <a:t>9/17/18 8:50 PM</a:t>
+              <a:t>3/4/19 8:32 PM</a:t>
             </a:fld>
             <a:endParaRPr lang="en-US" dirty="0"/>
           </a:p>
@@ -3356,7 +3356,7 @@
           <a:p>
             <a:fld id="{D18B56EA-E28F-4F92-9F16-7A6F2501B303}" type="datetime8">
               <a:rPr lang="en-US" smtClean="0"/>
-              <a:t>9/17/18 8:50 PM</a:t>
+              <a:t>3/4/19 8:32 PM</a:t>
             </a:fld>
             <a:endParaRPr lang="en-US" dirty="0"/>
           </a:p>
@@ -4414,7 +4414,7 @@
           <a:p>
             <a:fld id="{D18B56EA-E28F-4F92-9F16-7A6F2501B303}" type="datetime8">
               <a:rPr lang="en-US" smtClean="0"/>
-              <a:t>9/17/18 8:50 PM</a:t>
+              <a:t>3/4/19 8:32 PM</a:t>
             </a:fld>
             <a:endParaRPr lang="en-US" dirty="0"/>
           </a:p>

</xml_diff>

<commit_message>
OfficeAddins - Module 5: FY2019Q3 Quarterly refresh (#577)
* officeaddins m5 - fy19q3 quarterly refresh

- added copyright to edited files
- updated slides & code samples to work against all current deps

* addressed reviewer feedback

- fixed bug in vue example
- fixed copyright placement
</commit_message>
<xml_diff>
--- a/OfficeAddin/05 Using modern JavaScript/01 Build an Office Add-in using React.pptx
+++ b/OfficeAddin/05 Using modern JavaScript/01 Build an Office Add-in using React.pptx
@@ -265,7 +265,7 @@
               <a:rPr lang="en-US" smtClean="0">
                 <a:latin typeface="Segoe UI" pitchFamily="34" charset="0"/>
               </a:rPr>
-              <a:t>9/17/18 8:50 PM</a:t>
+              <a:t>3/4/19 8:32 PM</a:t>
             </a:fld>
             <a:endParaRPr lang="en-US" dirty="0">
               <a:latin typeface="Segoe UI" pitchFamily="34" charset="0"/>
@@ -559,7 +559,7 @@
           <a:p>
             <a:fld id="{D18B56EA-E28F-4F92-9F16-7A6F2501B303}" type="datetime8">
               <a:rPr lang="en-US" smtClean="0"/>
-              <a:t>9/17/18 8:50 PM</a:t>
+              <a:t>3/4/19 8:32 PM</a:t>
             </a:fld>
             <a:endParaRPr lang="en-US" dirty="0"/>
           </a:p>
@@ -1047,7 +1047,7 @@
                 <a:tabLst/>
                 <a:defRPr/>
               </a:pPr>
-              <a:t>9/17/18 8:50 PM</a:t>
+              <a:t>3/4/19 8:32 PM</a:t>
             </a:fld>
             <a:endParaRPr kumimoji="0" lang="en-US" sz="1200" b="0" i="0" u="none" strike="noStrike" kern="1200" cap="none" spc="0" normalizeH="0" baseline="0" noProof="0" dirty="0">
               <a:ln>
@@ -1300,7 +1300,7 @@
           <a:p>
             <a:fld id="{D18B56EA-E28F-4F92-9F16-7A6F2501B303}" type="datetime8">
               <a:rPr lang="en-US" smtClean="0"/>
-              <a:t>9/17/18 8:50 PM</a:t>
+              <a:t>3/4/19 8:32 PM</a:t>
             </a:fld>
             <a:endParaRPr lang="en-US" dirty="0"/>
           </a:p>
@@ -1481,7 +1481,7 @@
           <a:p>
             <a:fld id="{D18B56EA-E28F-4F92-9F16-7A6F2501B303}" type="datetime8">
               <a:rPr lang="en-US" smtClean="0"/>
-              <a:t>9/17/18 8:50 PM</a:t>
+              <a:t>3/4/19 8:32 PM</a:t>
             </a:fld>
             <a:endParaRPr lang="en-US" dirty="0"/>
           </a:p>
@@ -1662,7 +1662,7 @@
           <a:p>
             <a:fld id="{D18B56EA-E28F-4F92-9F16-7A6F2501B303}" type="datetime8">
               <a:rPr lang="en-US" smtClean="0"/>
-              <a:t>9/17/18 8:50 PM</a:t>
+              <a:t>3/4/19 8:32 PM</a:t>
             </a:fld>
             <a:endParaRPr lang="en-US" dirty="0"/>
           </a:p>
@@ -1948,7 +1948,7 @@
                 <a:tabLst/>
                 <a:defRPr/>
               </a:pPr>
-              <a:t>9/17/18 8:50 PM</a:t>
+              <a:t>3/4/19 8:32 PM</a:t>
             </a:fld>
             <a:endParaRPr kumimoji="0" lang="en-US" sz="1200" b="0" i="0" u="none" strike="noStrike" kern="1200" cap="none" spc="0" normalizeH="0" baseline="0" noProof="0" dirty="0">
               <a:ln>
@@ -2226,7 +2226,7 @@
           <a:p>
             <a:fld id="{D18B56EA-E28F-4F92-9F16-7A6F2501B303}" type="datetime8">
               <a:rPr lang="en-US" smtClean="0"/>
-              <a:t>9/17/18 8:50 PM</a:t>
+              <a:t>3/4/19 8:32 PM</a:t>
             </a:fld>
             <a:endParaRPr lang="en-US" dirty="0"/>
           </a:p>
@@ -2489,7 +2489,7 @@
           <a:p>
             <a:fld id="{D18B56EA-E28F-4F92-9F16-7A6F2501B303}" type="datetime8">
               <a:rPr lang="en-US" smtClean="0"/>
-              <a:t>9/17/18 8:50 PM</a:t>
+              <a:t>3/4/19 8:32 PM</a:t>
             </a:fld>
             <a:endParaRPr lang="en-US" dirty="0"/>
           </a:p>
@@ -2728,7 +2728,7 @@
           <a:p>
             <a:fld id="{D18B56EA-E28F-4F92-9F16-7A6F2501B303}" type="datetime8">
               <a:rPr lang="en-US" smtClean="0"/>
-              <a:t>9/17/18 8:50 PM</a:t>
+              <a:t>3/4/19 8:32 PM</a:t>
             </a:fld>
             <a:endParaRPr lang="en-US" dirty="0"/>
           </a:p>
@@ -2950,7 +2950,7 @@
           <a:p>
             <a:fld id="{D18B56EA-E28F-4F92-9F16-7A6F2501B303}" type="datetime8">
               <a:rPr lang="en-US" smtClean="0"/>
-              <a:t>9/17/18 8:50 PM</a:t>
+              <a:t>3/4/19 8:32 PM</a:t>
             </a:fld>
             <a:endParaRPr lang="en-US" dirty="0"/>
           </a:p>
@@ -3155,7 +3155,7 @@
           <a:p>
             <a:fld id="{D18B56EA-E28F-4F92-9F16-7A6F2501B303}" type="datetime8">
               <a:rPr lang="en-US" smtClean="0"/>
-              <a:t>9/17/18 8:50 PM</a:t>
+              <a:t>3/4/19 8:32 PM</a:t>
             </a:fld>
             <a:endParaRPr lang="en-US" dirty="0"/>
           </a:p>
@@ -3356,7 +3356,7 @@
           <a:p>
             <a:fld id="{D18B56EA-E28F-4F92-9F16-7A6F2501B303}" type="datetime8">
               <a:rPr lang="en-US" smtClean="0"/>
-              <a:t>9/17/18 8:50 PM</a:t>
+              <a:t>3/4/19 8:32 PM</a:t>
             </a:fld>
             <a:endParaRPr lang="en-US" dirty="0"/>
           </a:p>
@@ -4414,7 +4414,7 @@
           <a:p>
             <a:fld id="{D18B56EA-E28F-4F92-9F16-7A6F2501B303}" type="datetime8">
               <a:rPr lang="en-US" smtClean="0"/>
-              <a:t>9/17/18 8:50 PM</a:t>
+              <a:t>3/4/19 8:32 PM</a:t>
             </a:fld>
             <a:endParaRPr lang="en-US" dirty="0"/>
           </a:p>

</xml_diff>

<commit_message>
Office Addins - Module 5: FY2019Q4 Quarterly refresh (#592)
* FY19Q4 content refresh

- updated to reflect new project structure from Yeoman generator

* Update lab per reviewer feedback

* add statement to upgrade webpack-cli on Windows

* fixup broken images
</commit_message>
<xml_diff>
--- a/OfficeAddin/05 Using modern JavaScript/01 Build an Office Add-in using React.pptx
+++ b/OfficeAddin/05 Using modern JavaScript/01 Build an Office Add-in using React.pptx
@@ -265,7 +265,7 @@
               <a:rPr lang="en-US" smtClean="0">
                 <a:latin typeface="Segoe UI" pitchFamily="34" charset="0"/>
               </a:rPr>
-              <a:t>3/4/19 8:32 PM</a:t>
+              <a:t>6/5/19 4:29 PM</a:t>
             </a:fld>
             <a:endParaRPr lang="en-US" dirty="0">
               <a:latin typeface="Segoe UI" pitchFamily="34" charset="0"/>
@@ -559,7 +559,7 @@
           <a:p>
             <a:fld id="{D18B56EA-E28F-4F92-9F16-7A6F2501B303}" type="datetime8">
               <a:rPr lang="en-US" smtClean="0"/>
-              <a:t>3/4/19 8:32 PM</a:t>
+              <a:t>6/5/19 4:29 PM</a:t>
             </a:fld>
             <a:endParaRPr lang="en-US" dirty="0"/>
           </a:p>
@@ -1047,7 +1047,7 @@
                 <a:tabLst/>
                 <a:defRPr/>
               </a:pPr>
-              <a:t>3/4/19 8:32 PM</a:t>
+              <a:t>6/5/19 4:29 PM</a:t>
             </a:fld>
             <a:endParaRPr kumimoji="0" lang="en-US" sz="1200" b="0" i="0" u="none" strike="noStrike" kern="1200" cap="none" spc="0" normalizeH="0" baseline="0" noProof="0" dirty="0">
               <a:ln>
@@ -1300,7 +1300,7 @@
           <a:p>
             <a:fld id="{D18B56EA-E28F-4F92-9F16-7A6F2501B303}" type="datetime8">
               <a:rPr lang="en-US" smtClean="0"/>
-              <a:t>3/4/19 8:32 PM</a:t>
+              <a:t>6/5/19 4:29 PM</a:t>
             </a:fld>
             <a:endParaRPr lang="en-US" dirty="0"/>
           </a:p>
@@ -1481,7 +1481,7 @@
           <a:p>
             <a:fld id="{D18B56EA-E28F-4F92-9F16-7A6F2501B303}" type="datetime8">
               <a:rPr lang="en-US" smtClean="0"/>
-              <a:t>3/4/19 8:32 PM</a:t>
+              <a:t>6/5/19 4:29 PM</a:t>
             </a:fld>
             <a:endParaRPr lang="en-US" dirty="0"/>
           </a:p>
@@ -1662,7 +1662,7 @@
           <a:p>
             <a:fld id="{D18B56EA-E28F-4F92-9F16-7A6F2501B303}" type="datetime8">
               <a:rPr lang="en-US" smtClean="0"/>
-              <a:t>3/4/19 8:32 PM</a:t>
+              <a:t>6/5/19 4:29 PM</a:t>
             </a:fld>
             <a:endParaRPr lang="en-US" dirty="0"/>
           </a:p>
@@ -1948,7 +1948,7 @@
                 <a:tabLst/>
                 <a:defRPr/>
               </a:pPr>
-              <a:t>3/4/19 8:32 PM</a:t>
+              <a:t>6/5/19 4:29 PM</a:t>
             </a:fld>
             <a:endParaRPr kumimoji="0" lang="en-US" sz="1200" b="0" i="0" u="none" strike="noStrike" kern="1200" cap="none" spc="0" normalizeH="0" baseline="0" noProof="0" dirty="0">
               <a:ln>
@@ -2226,7 +2226,7 @@
           <a:p>
             <a:fld id="{D18B56EA-E28F-4F92-9F16-7A6F2501B303}" type="datetime8">
               <a:rPr lang="en-US" smtClean="0"/>
-              <a:t>3/4/19 8:32 PM</a:t>
+              <a:t>6/5/19 4:29 PM</a:t>
             </a:fld>
             <a:endParaRPr lang="en-US" dirty="0"/>
           </a:p>
@@ -2489,7 +2489,7 @@
           <a:p>
             <a:fld id="{D18B56EA-E28F-4F92-9F16-7A6F2501B303}" type="datetime8">
               <a:rPr lang="en-US" smtClean="0"/>
-              <a:t>3/4/19 8:32 PM</a:t>
+              <a:t>6/5/19 4:29 PM</a:t>
             </a:fld>
             <a:endParaRPr lang="en-US" dirty="0"/>
           </a:p>
@@ -2728,7 +2728,7 @@
           <a:p>
             <a:fld id="{D18B56EA-E28F-4F92-9F16-7A6F2501B303}" type="datetime8">
               <a:rPr lang="en-US" smtClean="0"/>
-              <a:t>3/4/19 8:32 PM</a:t>
+              <a:t>6/5/19 4:29 PM</a:t>
             </a:fld>
             <a:endParaRPr lang="en-US" dirty="0"/>
           </a:p>
@@ -2950,7 +2950,7 @@
           <a:p>
             <a:fld id="{D18B56EA-E28F-4F92-9F16-7A6F2501B303}" type="datetime8">
               <a:rPr lang="en-US" smtClean="0"/>
-              <a:t>3/4/19 8:32 PM</a:t>
+              <a:t>6/5/19 4:29 PM</a:t>
             </a:fld>
             <a:endParaRPr lang="en-US" dirty="0"/>
           </a:p>
@@ -3155,7 +3155,7 @@
           <a:p>
             <a:fld id="{D18B56EA-E28F-4F92-9F16-7A6F2501B303}" type="datetime8">
               <a:rPr lang="en-US" smtClean="0"/>
-              <a:t>3/4/19 8:32 PM</a:t>
+              <a:t>6/5/19 4:29 PM</a:t>
             </a:fld>
             <a:endParaRPr lang="en-US" dirty="0"/>
           </a:p>
@@ -3356,7 +3356,7 @@
           <a:p>
             <a:fld id="{D18B56EA-E28F-4F92-9F16-7A6F2501B303}" type="datetime8">
               <a:rPr lang="en-US" smtClean="0"/>
-              <a:t>3/4/19 8:32 PM</a:t>
+              <a:t>6/5/19 4:29 PM</a:t>
             </a:fld>
             <a:endParaRPr lang="en-US" dirty="0"/>
           </a:p>
@@ -4414,7 +4414,7 @@
           <a:p>
             <a:fld id="{D18B56EA-E28F-4F92-9F16-7A6F2501B303}" type="datetime8">
               <a:rPr lang="en-US" smtClean="0"/>
-              <a:t>3/4/19 8:32 PM</a:t>
+              <a:t>6/5/19 4:29 PM</a:t>
             </a:fld>
             <a:endParaRPr lang="en-US" dirty="0"/>
           </a:p>
@@ -14710,7 +14710,7 @@
       </a:lvl9pPr>
     </p:otherStyle>
   </p:txStyles>
-  <p:extLst mod="1">
+  <p:extLst>
     <p:ext uri="{27BBF7A9-308A-43DC-89C8-2F10F3537804}">
       <p15:sldGuideLst xmlns:p15="http://schemas.microsoft.com/office/powerpoint/2012/main">
         <p15:guide id="3" pos="1381" userDrawn="1">

</xml_diff>

<commit_message>
FY2020Q1 OfficeAddins M5 content refresh
</commit_message>
<xml_diff>
--- a/OfficeAddin/05 Using modern JavaScript/01 Build an Office Add-in using React.pptx
+++ b/OfficeAddin/05 Using modern JavaScript/01 Build an Office Add-in using React.pptx
@@ -265,7 +265,7 @@
               <a:rPr lang="en-US" smtClean="0">
                 <a:latin typeface="Segoe UI" pitchFamily="34" charset="0"/>
               </a:rPr>
-              <a:t>6/5/19 4:29 PM</a:t>
+              <a:t>9/8/19 8:32 PM</a:t>
             </a:fld>
             <a:endParaRPr lang="en-US" dirty="0">
               <a:latin typeface="Segoe UI" pitchFamily="34" charset="0"/>
@@ -559,7 +559,7 @@
           <a:p>
             <a:fld id="{D18B56EA-E28F-4F92-9F16-7A6F2501B303}" type="datetime8">
               <a:rPr lang="en-US" smtClean="0"/>
-              <a:t>6/5/19 4:29 PM</a:t>
+              <a:t>9/8/19 8:30 PM</a:t>
             </a:fld>
             <a:endParaRPr lang="en-US" dirty="0"/>
           </a:p>
@@ -1047,7 +1047,7 @@
                 <a:tabLst/>
                 <a:defRPr/>
               </a:pPr>
-              <a:t>6/5/19 4:29 PM</a:t>
+              <a:t>9/8/19 8:30 PM</a:t>
             </a:fld>
             <a:endParaRPr kumimoji="0" lang="en-US" sz="1200" b="0" i="0" u="none" strike="noStrike" kern="1200" cap="none" spc="0" normalizeH="0" baseline="0" noProof="0" dirty="0">
               <a:ln>
@@ -1300,7 +1300,7 @@
           <a:p>
             <a:fld id="{D18B56EA-E28F-4F92-9F16-7A6F2501B303}" type="datetime8">
               <a:rPr lang="en-US" smtClean="0"/>
-              <a:t>6/5/19 4:29 PM</a:t>
+              <a:t>9/8/19 8:32 PM</a:t>
             </a:fld>
             <a:endParaRPr lang="en-US" dirty="0"/>
           </a:p>
@@ -1481,7 +1481,7 @@
           <a:p>
             <a:fld id="{D18B56EA-E28F-4F92-9F16-7A6F2501B303}" type="datetime8">
               <a:rPr lang="en-US" smtClean="0"/>
-              <a:t>6/5/19 4:29 PM</a:t>
+              <a:t>9/8/19 8:32 PM</a:t>
             </a:fld>
             <a:endParaRPr lang="en-US" dirty="0"/>
           </a:p>
@@ -1662,7 +1662,7 @@
           <a:p>
             <a:fld id="{D18B56EA-E28F-4F92-9F16-7A6F2501B303}" type="datetime8">
               <a:rPr lang="en-US" smtClean="0"/>
-              <a:t>6/5/19 4:29 PM</a:t>
+              <a:t>9/8/19 8:32 PM</a:t>
             </a:fld>
             <a:endParaRPr lang="en-US" dirty="0"/>
           </a:p>
@@ -1948,7 +1948,7 @@
                 <a:tabLst/>
                 <a:defRPr/>
               </a:pPr>
-              <a:t>6/5/19 4:29 PM</a:t>
+              <a:t>9/8/19 8:30 PM</a:t>
             </a:fld>
             <a:endParaRPr kumimoji="0" lang="en-US" sz="1200" b="0" i="0" u="none" strike="noStrike" kern="1200" cap="none" spc="0" normalizeH="0" baseline="0" noProof="0" dirty="0">
               <a:ln>
@@ -2226,7 +2226,7 @@
           <a:p>
             <a:fld id="{D18B56EA-E28F-4F92-9F16-7A6F2501B303}" type="datetime8">
               <a:rPr lang="en-US" smtClean="0"/>
-              <a:t>6/5/19 4:29 PM</a:t>
+              <a:t>9/8/19 8:30 PM</a:t>
             </a:fld>
             <a:endParaRPr lang="en-US" dirty="0"/>
           </a:p>
@@ -2489,7 +2489,7 @@
           <a:p>
             <a:fld id="{D18B56EA-E28F-4F92-9F16-7A6F2501B303}" type="datetime8">
               <a:rPr lang="en-US" smtClean="0"/>
-              <a:t>6/5/19 4:29 PM</a:t>
+              <a:t>9/8/19 8:30 PM</a:t>
             </a:fld>
             <a:endParaRPr lang="en-US" dirty="0"/>
           </a:p>
@@ -2728,7 +2728,7 @@
           <a:p>
             <a:fld id="{D18B56EA-E28F-4F92-9F16-7A6F2501B303}" type="datetime8">
               <a:rPr lang="en-US" smtClean="0"/>
-              <a:t>6/5/19 4:29 PM</a:t>
+              <a:t>9/8/19 8:30 PM</a:t>
             </a:fld>
             <a:endParaRPr lang="en-US" dirty="0"/>
           </a:p>
@@ -2950,7 +2950,7 @@
           <a:p>
             <a:fld id="{D18B56EA-E28F-4F92-9F16-7A6F2501B303}" type="datetime8">
               <a:rPr lang="en-US" smtClean="0"/>
-              <a:t>6/5/19 4:29 PM</a:t>
+              <a:t>9/8/19 8:32 PM</a:t>
             </a:fld>
             <a:endParaRPr lang="en-US" dirty="0"/>
           </a:p>
@@ -3155,7 +3155,7 @@
           <a:p>
             <a:fld id="{D18B56EA-E28F-4F92-9F16-7A6F2501B303}" type="datetime8">
               <a:rPr lang="en-US" smtClean="0"/>
-              <a:t>6/5/19 4:29 PM</a:t>
+              <a:t>9/8/19 8:32 PM</a:t>
             </a:fld>
             <a:endParaRPr lang="en-US" dirty="0"/>
           </a:p>
@@ -3356,7 +3356,7 @@
           <a:p>
             <a:fld id="{D18B56EA-E28F-4F92-9F16-7A6F2501B303}" type="datetime8">
               <a:rPr lang="en-US" smtClean="0"/>
-              <a:t>6/5/19 4:29 PM</a:t>
+              <a:t>9/8/19 8:32 PM</a:t>
             </a:fld>
             <a:endParaRPr lang="en-US" dirty="0"/>
           </a:p>
@@ -4414,7 +4414,7 @@
           <a:p>
             <a:fld id="{D18B56EA-E28F-4F92-9F16-7A6F2501B303}" type="datetime8">
               <a:rPr lang="en-US" smtClean="0"/>
-              <a:t>6/5/19 4:29 PM</a:t>
+              <a:t>9/8/19 8:32 PM</a:t>
             </a:fld>
             <a:endParaRPr lang="en-US" dirty="0"/>
           </a:p>
@@ -15529,7 +15529,7 @@
         <p:spPr>
           <a:xfrm>
             <a:off x="465138" y="1930734"/>
-            <a:ext cx="11533187" cy="3785652"/>
+            <a:ext cx="11533187" cy="4001095"/>
           </a:xfrm>
         </p:spPr>
         <p:txBody>
@@ -15574,7 +15574,7 @@
               <a:rPr lang="en-US" sz="1600" dirty="0">
                 <a:hlinkClick r:id="rId3"/>
               </a:rPr>
-              <a:t>https://dev.office.com/docs/add-ins/excel/excel-add-ins-get-started-react</a:t>
+              <a:t>https://docs.microsoft.com/en-us/office/dev/add-ins/quickstarts/excel-quickstart-react</a:t>
             </a:r>
             <a:endParaRPr lang="en-US" sz="1600" dirty="0"/>
           </a:p>
@@ -15631,7 +15631,7 @@
               <a:rPr lang="en-US" sz="1600" dirty="0">
                 <a:hlinkClick r:id="rId4"/>
               </a:rPr>
-              <a:t>https://dev.office.com/docs/add-ins/design/using-office-ui-fabric-react</a:t>
+              <a:t>https://docs.microsoft.com/en-us/office/dev/add-ins/design/using-office-ui-fabric-react</a:t>
             </a:r>
             <a:endParaRPr lang="en-US" sz="1600" dirty="0"/>
           </a:p>
@@ -15688,7 +15688,7 @@
               <a:rPr lang="en-US" sz="1600" dirty="0">
                 <a:hlinkClick r:id="rId5"/>
               </a:rPr>
-              <a:t>https://dev.office.com/docs/add-ins/testing/create-a-network-shared-folder-catalog-for-task-pane-and-content-add-ins</a:t>
+              <a:t>https://docs.microsoft.com/en-us/office/dev/add-ins/testing/create-a-network-shared-folder-catalog-for-task-pane-and-content-add-ins</a:t>
             </a:r>
             <a:endParaRPr lang="en-US" sz="1600" dirty="0"/>
           </a:p>
@@ -15737,7 +15737,13 @@
               <a:rPr lang="en-US" sz="1600" dirty="0">
                 <a:hlinkClick r:id="rId6"/>
               </a:rPr>
-              <a:t>https://dev.office.com/docs/add-ins/testing/sideload-office-add-ins-for-testing</a:t>
+              <a:t>https://docs.microsoft.com/en</a:t>
+            </a:r>
+            <a:r>
+              <a:rPr lang="en-US" sz="1600">
+                <a:hlinkClick r:id="rId6"/>
+              </a:rPr>
+              <a:t>-us/office/dev/add-ins/testing/sideload-office-add-ins-for-testing</a:t>
             </a:r>
             <a:endParaRPr lang="en-US" sz="1600" dirty="0"/>
           </a:p>

</xml_diff>

<commit_message>
OfficeAddins - Module 5: FY2020Q1 Quarterly refresh (#621)
* FY2020Q1 OfficeAddins M5 content refresh

* addressing reviewer feedback

* Fixed uppercase issue found in review

* typo fixup

* update lab to fixup typo
</commit_message>
<xml_diff>
--- a/OfficeAddin/05 Using modern JavaScript/01 Build an Office Add-in using React.pptx
+++ b/OfficeAddin/05 Using modern JavaScript/01 Build an Office Add-in using React.pptx
@@ -265,7 +265,7 @@
               <a:rPr lang="en-US" smtClean="0">
                 <a:latin typeface="Segoe UI" pitchFamily="34" charset="0"/>
               </a:rPr>
-              <a:t>6/5/19 4:29 PM</a:t>
+              <a:t>9/8/19 8:32 PM</a:t>
             </a:fld>
             <a:endParaRPr lang="en-US" dirty="0">
               <a:latin typeface="Segoe UI" pitchFamily="34" charset="0"/>
@@ -559,7 +559,7 @@
           <a:p>
             <a:fld id="{D18B56EA-E28F-4F92-9F16-7A6F2501B303}" type="datetime8">
               <a:rPr lang="en-US" smtClean="0"/>
-              <a:t>6/5/19 4:29 PM</a:t>
+              <a:t>9/8/19 8:30 PM</a:t>
             </a:fld>
             <a:endParaRPr lang="en-US" dirty="0"/>
           </a:p>
@@ -1047,7 +1047,7 @@
                 <a:tabLst/>
                 <a:defRPr/>
               </a:pPr>
-              <a:t>6/5/19 4:29 PM</a:t>
+              <a:t>9/8/19 8:30 PM</a:t>
             </a:fld>
             <a:endParaRPr kumimoji="0" lang="en-US" sz="1200" b="0" i="0" u="none" strike="noStrike" kern="1200" cap="none" spc="0" normalizeH="0" baseline="0" noProof="0" dirty="0">
               <a:ln>
@@ -1300,7 +1300,7 @@
           <a:p>
             <a:fld id="{D18B56EA-E28F-4F92-9F16-7A6F2501B303}" type="datetime8">
               <a:rPr lang="en-US" smtClean="0"/>
-              <a:t>6/5/19 4:29 PM</a:t>
+              <a:t>9/8/19 8:32 PM</a:t>
             </a:fld>
             <a:endParaRPr lang="en-US" dirty="0"/>
           </a:p>
@@ -1481,7 +1481,7 @@
           <a:p>
             <a:fld id="{D18B56EA-E28F-4F92-9F16-7A6F2501B303}" type="datetime8">
               <a:rPr lang="en-US" smtClean="0"/>
-              <a:t>6/5/19 4:29 PM</a:t>
+              <a:t>9/8/19 8:32 PM</a:t>
             </a:fld>
             <a:endParaRPr lang="en-US" dirty="0"/>
           </a:p>
@@ -1662,7 +1662,7 @@
           <a:p>
             <a:fld id="{D18B56EA-E28F-4F92-9F16-7A6F2501B303}" type="datetime8">
               <a:rPr lang="en-US" smtClean="0"/>
-              <a:t>6/5/19 4:29 PM</a:t>
+              <a:t>9/8/19 8:32 PM</a:t>
             </a:fld>
             <a:endParaRPr lang="en-US" dirty="0"/>
           </a:p>
@@ -1948,7 +1948,7 @@
                 <a:tabLst/>
                 <a:defRPr/>
               </a:pPr>
-              <a:t>6/5/19 4:29 PM</a:t>
+              <a:t>9/8/19 8:30 PM</a:t>
             </a:fld>
             <a:endParaRPr kumimoji="0" lang="en-US" sz="1200" b="0" i="0" u="none" strike="noStrike" kern="1200" cap="none" spc="0" normalizeH="0" baseline="0" noProof="0" dirty="0">
               <a:ln>
@@ -2226,7 +2226,7 @@
           <a:p>
             <a:fld id="{D18B56EA-E28F-4F92-9F16-7A6F2501B303}" type="datetime8">
               <a:rPr lang="en-US" smtClean="0"/>
-              <a:t>6/5/19 4:29 PM</a:t>
+              <a:t>9/8/19 8:30 PM</a:t>
             </a:fld>
             <a:endParaRPr lang="en-US" dirty="0"/>
           </a:p>
@@ -2489,7 +2489,7 @@
           <a:p>
             <a:fld id="{D18B56EA-E28F-4F92-9F16-7A6F2501B303}" type="datetime8">
               <a:rPr lang="en-US" smtClean="0"/>
-              <a:t>6/5/19 4:29 PM</a:t>
+              <a:t>9/8/19 8:30 PM</a:t>
             </a:fld>
             <a:endParaRPr lang="en-US" dirty="0"/>
           </a:p>
@@ -2728,7 +2728,7 @@
           <a:p>
             <a:fld id="{D18B56EA-E28F-4F92-9F16-7A6F2501B303}" type="datetime8">
               <a:rPr lang="en-US" smtClean="0"/>
-              <a:t>6/5/19 4:29 PM</a:t>
+              <a:t>9/8/19 8:30 PM</a:t>
             </a:fld>
             <a:endParaRPr lang="en-US" dirty="0"/>
           </a:p>
@@ -2950,7 +2950,7 @@
           <a:p>
             <a:fld id="{D18B56EA-E28F-4F92-9F16-7A6F2501B303}" type="datetime8">
               <a:rPr lang="en-US" smtClean="0"/>
-              <a:t>6/5/19 4:29 PM</a:t>
+              <a:t>9/8/19 8:32 PM</a:t>
             </a:fld>
             <a:endParaRPr lang="en-US" dirty="0"/>
           </a:p>
@@ -3155,7 +3155,7 @@
           <a:p>
             <a:fld id="{D18B56EA-E28F-4F92-9F16-7A6F2501B303}" type="datetime8">
               <a:rPr lang="en-US" smtClean="0"/>
-              <a:t>6/5/19 4:29 PM</a:t>
+              <a:t>9/8/19 8:32 PM</a:t>
             </a:fld>
             <a:endParaRPr lang="en-US" dirty="0"/>
           </a:p>
@@ -3356,7 +3356,7 @@
           <a:p>
             <a:fld id="{D18B56EA-E28F-4F92-9F16-7A6F2501B303}" type="datetime8">
               <a:rPr lang="en-US" smtClean="0"/>
-              <a:t>6/5/19 4:29 PM</a:t>
+              <a:t>9/8/19 8:32 PM</a:t>
             </a:fld>
             <a:endParaRPr lang="en-US" dirty="0"/>
           </a:p>
@@ -4414,7 +4414,7 @@
           <a:p>
             <a:fld id="{D18B56EA-E28F-4F92-9F16-7A6F2501B303}" type="datetime8">
               <a:rPr lang="en-US" smtClean="0"/>
-              <a:t>6/5/19 4:29 PM</a:t>
+              <a:t>9/8/19 8:32 PM</a:t>
             </a:fld>
             <a:endParaRPr lang="en-US" dirty="0"/>
           </a:p>
@@ -15529,7 +15529,7 @@
         <p:spPr>
           <a:xfrm>
             <a:off x="465138" y="1930734"/>
-            <a:ext cx="11533187" cy="3785652"/>
+            <a:ext cx="11533187" cy="4001095"/>
           </a:xfrm>
         </p:spPr>
         <p:txBody>
@@ -15574,7 +15574,7 @@
               <a:rPr lang="en-US" sz="1600" dirty="0">
                 <a:hlinkClick r:id="rId3"/>
               </a:rPr>
-              <a:t>https://dev.office.com/docs/add-ins/excel/excel-add-ins-get-started-react</a:t>
+              <a:t>https://docs.microsoft.com/en-us/office/dev/add-ins/quickstarts/excel-quickstart-react</a:t>
             </a:r>
             <a:endParaRPr lang="en-US" sz="1600" dirty="0"/>
           </a:p>
@@ -15631,7 +15631,7 @@
               <a:rPr lang="en-US" sz="1600" dirty="0">
                 <a:hlinkClick r:id="rId4"/>
               </a:rPr>
-              <a:t>https://dev.office.com/docs/add-ins/design/using-office-ui-fabric-react</a:t>
+              <a:t>https://docs.microsoft.com/en-us/office/dev/add-ins/design/using-office-ui-fabric-react</a:t>
             </a:r>
             <a:endParaRPr lang="en-US" sz="1600" dirty="0"/>
           </a:p>
@@ -15688,7 +15688,7 @@
               <a:rPr lang="en-US" sz="1600" dirty="0">
                 <a:hlinkClick r:id="rId5"/>
               </a:rPr>
-              <a:t>https://dev.office.com/docs/add-ins/testing/create-a-network-shared-folder-catalog-for-task-pane-and-content-add-ins</a:t>
+              <a:t>https://docs.microsoft.com/en-us/office/dev/add-ins/testing/create-a-network-shared-folder-catalog-for-task-pane-and-content-add-ins</a:t>
             </a:r>
             <a:endParaRPr lang="en-US" sz="1600" dirty="0"/>
           </a:p>
@@ -15737,7 +15737,13 @@
               <a:rPr lang="en-US" sz="1600" dirty="0">
                 <a:hlinkClick r:id="rId6"/>
               </a:rPr>
-              <a:t>https://dev.office.com/docs/add-ins/testing/sideload-office-add-ins-for-testing</a:t>
+              <a:t>https://docs.microsoft.com/en</a:t>
+            </a:r>
+            <a:r>
+              <a:rPr lang="en-US" sz="1600">
+                <a:hlinkClick r:id="rId6"/>
+              </a:rPr>
+              <a:t>-us/office/dev/add-ins/testing/sideload-office-add-ins-for-testing</a:t>
             </a:r>
             <a:endParaRPr lang="en-US" sz="1600" dirty="0"/>
           </a:p>

</xml_diff>

<commit_message>
FY2020Q3 content refresh: Office Addins - M05 (Modern JS)
</commit_message>
<xml_diff>
--- a/OfficeAddin/05 Using modern JavaScript/01 Build an Office Add-in using React.pptx
+++ b/OfficeAddin/05 Using modern JavaScript/01 Build an Office Add-in using React.pptx
@@ -265,7 +265,7 @@
               <a:rPr lang="en-US" smtClean="0">
                 <a:latin typeface="Segoe UI" pitchFamily="34" charset="0"/>
               </a:rPr>
-              <a:t>9/8/19 8:32 PM</a:t>
+              <a:t>3/4/20 9:04 PM</a:t>
             </a:fld>
             <a:endParaRPr lang="en-US" dirty="0">
               <a:latin typeface="Segoe UI" pitchFamily="34" charset="0"/>
@@ -559,7 +559,7 @@
           <a:p>
             <a:fld id="{D18B56EA-E28F-4F92-9F16-7A6F2501B303}" type="datetime8">
               <a:rPr lang="en-US" smtClean="0"/>
-              <a:t>9/8/19 8:30 PM</a:t>
+              <a:t>3/4/20 9:03 PM</a:t>
             </a:fld>
             <a:endParaRPr lang="en-US" dirty="0"/>
           </a:p>
@@ -1047,7 +1047,7 @@
                 <a:tabLst/>
                 <a:defRPr/>
               </a:pPr>
-              <a:t>9/8/19 8:30 PM</a:t>
+              <a:t>3/4/20 9:03 PM</a:t>
             </a:fld>
             <a:endParaRPr kumimoji="0" lang="en-US" sz="1200" b="0" i="0" u="none" strike="noStrike" kern="1200" cap="none" spc="0" normalizeH="0" baseline="0" noProof="0" dirty="0">
               <a:ln>
@@ -1300,7 +1300,7 @@
           <a:p>
             <a:fld id="{D18B56EA-E28F-4F92-9F16-7A6F2501B303}" type="datetime8">
               <a:rPr lang="en-US" smtClean="0"/>
-              <a:t>9/8/19 8:32 PM</a:t>
+              <a:t>3/4/20 9:04 PM</a:t>
             </a:fld>
             <a:endParaRPr lang="en-US" dirty="0"/>
           </a:p>
@@ -1481,7 +1481,7 @@
           <a:p>
             <a:fld id="{D18B56EA-E28F-4F92-9F16-7A6F2501B303}" type="datetime8">
               <a:rPr lang="en-US" smtClean="0"/>
-              <a:t>9/8/19 8:32 PM</a:t>
+              <a:t>3/4/20 9:04 PM</a:t>
             </a:fld>
             <a:endParaRPr lang="en-US" dirty="0"/>
           </a:p>
@@ -1662,7 +1662,7 @@
           <a:p>
             <a:fld id="{D18B56EA-E28F-4F92-9F16-7A6F2501B303}" type="datetime8">
               <a:rPr lang="en-US" smtClean="0"/>
-              <a:t>9/8/19 8:32 PM</a:t>
+              <a:t>3/4/20 9:04 PM</a:t>
             </a:fld>
             <a:endParaRPr lang="en-US" dirty="0"/>
           </a:p>
@@ -1948,7 +1948,7 @@
                 <a:tabLst/>
                 <a:defRPr/>
               </a:pPr>
-              <a:t>9/8/19 8:30 PM</a:t>
+              <a:t>3/4/20 9:03 PM</a:t>
             </a:fld>
             <a:endParaRPr kumimoji="0" lang="en-US" sz="1200" b="0" i="0" u="none" strike="noStrike" kern="1200" cap="none" spc="0" normalizeH="0" baseline="0" noProof="0" dirty="0">
               <a:ln>
@@ -2226,7 +2226,7 @@
           <a:p>
             <a:fld id="{D18B56EA-E28F-4F92-9F16-7A6F2501B303}" type="datetime8">
               <a:rPr lang="en-US" smtClean="0"/>
-              <a:t>9/8/19 8:30 PM</a:t>
+              <a:t>3/4/20 9:03 PM</a:t>
             </a:fld>
             <a:endParaRPr lang="en-US" dirty="0"/>
           </a:p>
@@ -2489,7 +2489,7 @@
           <a:p>
             <a:fld id="{D18B56EA-E28F-4F92-9F16-7A6F2501B303}" type="datetime8">
               <a:rPr lang="en-US" smtClean="0"/>
-              <a:t>9/8/19 8:30 PM</a:t>
+              <a:t>3/4/20 9:03 PM</a:t>
             </a:fld>
             <a:endParaRPr lang="en-US" dirty="0"/>
           </a:p>
@@ -2728,7 +2728,7 @@
           <a:p>
             <a:fld id="{D18B56EA-E28F-4F92-9F16-7A6F2501B303}" type="datetime8">
               <a:rPr lang="en-US" smtClean="0"/>
-              <a:t>9/8/19 8:30 PM</a:t>
+              <a:t>3/4/20 9:04 PM</a:t>
             </a:fld>
             <a:endParaRPr lang="en-US" dirty="0"/>
           </a:p>
@@ -2950,7 +2950,7 @@
           <a:p>
             <a:fld id="{D18B56EA-E28F-4F92-9F16-7A6F2501B303}" type="datetime8">
               <a:rPr lang="en-US" smtClean="0"/>
-              <a:t>9/8/19 8:32 PM</a:t>
+              <a:t>3/4/20 9:04 PM</a:t>
             </a:fld>
             <a:endParaRPr lang="en-US" dirty="0"/>
           </a:p>
@@ -3155,7 +3155,7 @@
           <a:p>
             <a:fld id="{D18B56EA-E28F-4F92-9F16-7A6F2501B303}" type="datetime8">
               <a:rPr lang="en-US" smtClean="0"/>
-              <a:t>9/8/19 8:32 PM</a:t>
+              <a:t>3/4/20 9:04 PM</a:t>
             </a:fld>
             <a:endParaRPr lang="en-US" dirty="0"/>
           </a:p>
@@ -3356,7 +3356,7 @@
           <a:p>
             <a:fld id="{D18B56EA-E28F-4F92-9F16-7A6F2501B303}" type="datetime8">
               <a:rPr lang="en-US" smtClean="0"/>
-              <a:t>9/8/19 8:32 PM</a:t>
+              <a:t>3/4/20 9:04 PM</a:t>
             </a:fld>
             <a:endParaRPr lang="en-US" dirty="0"/>
           </a:p>
@@ -4414,7 +4414,7 @@
           <a:p>
             <a:fld id="{D18B56EA-E28F-4F92-9F16-7A6F2501B303}" type="datetime8">
               <a:rPr lang="en-US" smtClean="0"/>
-              <a:t>9/8/19 8:32 PM</a:t>
+              <a:t>3/4/20 9:04 PM</a:t>
             </a:fld>
             <a:endParaRPr lang="en-US" dirty="0"/>
           </a:p>
@@ -14949,7 +14949,7 @@
           <a:p>
             <a:r>
               <a:rPr lang="en-US" dirty="0"/>
-              <a:t>Build an Office add-in using React</a:t>
+              <a:t>Build an Office add-in using React </a:t>
             </a:r>
             <a:r>
               <a:rPr lang="en-US" dirty="0">
@@ -15737,13 +15737,7 @@
               <a:rPr lang="en-US" sz="1600" dirty="0">
                 <a:hlinkClick r:id="rId6"/>
               </a:rPr>
-              <a:t>https://docs.microsoft.com/en</a:t>
-            </a:r>
-            <a:r>
-              <a:rPr lang="en-US" sz="1600">
-                <a:hlinkClick r:id="rId6"/>
-              </a:rPr>
-              <a:t>-us/office/dev/add-ins/testing/sideload-office-add-ins-for-testing</a:t>
+              <a:t>https://docs.microsoft.com/en-us/office/dev/add-ins/testing/sideload-office-add-ins-for-testing</a:t>
             </a:r>
             <a:endParaRPr lang="en-US" sz="1600" dirty="0"/>
           </a:p>

</xml_diff>

<commit_message>
FY2020Q3 content refresh: Office Addins - M05 (Modern JS) (#677)
</commit_message>
<xml_diff>
--- a/OfficeAddin/05 Using modern JavaScript/01 Build an Office Add-in using React.pptx
+++ b/OfficeAddin/05 Using modern JavaScript/01 Build an Office Add-in using React.pptx
@@ -265,7 +265,7 @@
               <a:rPr lang="en-US" smtClean="0">
                 <a:latin typeface="Segoe UI" pitchFamily="34" charset="0"/>
               </a:rPr>
-              <a:t>9/8/19 8:32 PM</a:t>
+              <a:t>3/4/20 9:04 PM</a:t>
             </a:fld>
             <a:endParaRPr lang="en-US" dirty="0">
               <a:latin typeface="Segoe UI" pitchFamily="34" charset="0"/>
@@ -559,7 +559,7 @@
           <a:p>
             <a:fld id="{D18B56EA-E28F-4F92-9F16-7A6F2501B303}" type="datetime8">
               <a:rPr lang="en-US" smtClean="0"/>
-              <a:t>9/8/19 8:30 PM</a:t>
+              <a:t>3/4/20 9:03 PM</a:t>
             </a:fld>
             <a:endParaRPr lang="en-US" dirty="0"/>
           </a:p>
@@ -1047,7 +1047,7 @@
                 <a:tabLst/>
                 <a:defRPr/>
               </a:pPr>
-              <a:t>9/8/19 8:30 PM</a:t>
+              <a:t>3/4/20 9:03 PM</a:t>
             </a:fld>
             <a:endParaRPr kumimoji="0" lang="en-US" sz="1200" b="0" i="0" u="none" strike="noStrike" kern="1200" cap="none" spc="0" normalizeH="0" baseline="0" noProof="0" dirty="0">
               <a:ln>
@@ -1300,7 +1300,7 @@
           <a:p>
             <a:fld id="{D18B56EA-E28F-4F92-9F16-7A6F2501B303}" type="datetime8">
               <a:rPr lang="en-US" smtClean="0"/>
-              <a:t>9/8/19 8:32 PM</a:t>
+              <a:t>3/4/20 9:04 PM</a:t>
             </a:fld>
             <a:endParaRPr lang="en-US" dirty="0"/>
           </a:p>
@@ -1481,7 +1481,7 @@
           <a:p>
             <a:fld id="{D18B56EA-E28F-4F92-9F16-7A6F2501B303}" type="datetime8">
               <a:rPr lang="en-US" smtClean="0"/>
-              <a:t>9/8/19 8:32 PM</a:t>
+              <a:t>3/4/20 9:04 PM</a:t>
             </a:fld>
             <a:endParaRPr lang="en-US" dirty="0"/>
           </a:p>
@@ -1662,7 +1662,7 @@
           <a:p>
             <a:fld id="{D18B56EA-E28F-4F92-9F16-7A6F2501B303}" type="datetime8">
               <a:rPr lang="en-US" smtClean="0"/>
-              <a:t>9/8/19 8:32 PM</a:t>
+              <a:t>3/4/20 9:04 PM</a:t>
             </a:fld>
             <a:endParaRPr lang="en-US" dirty="0"/>
           </a:p>
@@ -1948,7 +1948,7 @@
                 <a:tabLst/>
                 <a:defRPr/>
               </a:pPr>
-              <a:t>9/8/19 8:30 PM</a:t>
+              <a:t>3/4/20 9:03 PM</a:t>
             </a:fld>
             <a:endParaRPr kumimoji="0" lang="en-US" sz="1200" b="0" i="0" u="none" strike="noStrike" kern="1200" cap="none" spc="0" normalizeH="0" baseline="0" noProof="0" dirty="0">
               <a:ln>
@@ -2226,7 +2226,7 @@
           <a:p>
             <a:fld id="{D18B56EA-E28F-4F92-9F16-7A6F2501B303}" type="datetime8">
               <a:rPr lang="en-US" smtClean="0"/>
-              <a:t>9/8/19 8:30 PM</a:t>
+              <a:t>3/4/20 9:03 PM</a:t>
             </a:fld>
             <a:endParaRPr lang="en-US" dirty="0"/>
           </a:p>
@@ -2489,7 +2489,7 @@
           <a:p>
             <a:fld id="{D18B56EA-E28F-4F92-9F16-7A6F2501B303}" type="datetime8">
               <a:rPr lang="en-US" smtClean="0"/>
-              <a:t>9/8/19 8:30 PM</a:t>
+              <a:t>3/4/20 9:03 PM</a:t>
             </a:fld>
             <a:endParaRPr lang="en-US" dirty="0"/>
           </a:p>
@@ -2728,7 +2728,7 @@
           <a:p>
             <a:fld id="{D18B56EA-E28F-4F92-9F16-7A6F2501B303}" type="datetime8">
               <a:rPr lang="en-US" smtClean="0"/>
-              <a:t>9/8/19 8:30 PM</a:t>
+              <a:t>3/4/20 9:04 PM</a:t>
             </a:fld>
             <a:endParaRPr lang="en-US" dirty="0"/>
           </a:p>
@@ -2950,7 +2950,7 @@
           <a:p>
             <a:fld id="{D18B56EA-E28F-4F92-9F16-7A6F2501B303}" type="datetime8">
               <a:rPr lang="en-US" smtClean="0"/>
-              <a:t>9/8/19 8:32 PM</a:t>
+              <a:t>3/4/20 9:04 PM</a:t>
             </a:fld>
             <a:endParaRPr lang="en-US" dirty="0"/>
           </a:p>
@@ -3155,7 +3155,7 @@
           <a:p>
             <a:fld id="{D18B56EA-E28F-4F92-9F16-7A6F2501B303}" type="datetime8">
               <a:rPr lang="en-US" smtClean="0"/>
-              <a:t>9/8/19 8:32 PM</a:t>
+              <a:t>3/4/20 9:04 PM</a:t>
             </a:fld>
             <a:endParaRPr lang="en-US" dirty="0"/>
           </a:p>
@@ -3356,7 +3356,7 @@
           <a:p>
             <a:fld id="{D18B56EA-E28F-4F92-9F16-7A6F2501B303}" type="datetime8">
               <a:rPr lang="en-US" smtClean="0"/>
-              <a:t>9/8/19 8:32 PM</a:t>
+              <a:t>3/4/20 9:04 PM</a:t>
             </a:fld>
             <a:endParaRPr lang="en-US" dirty="0"/>
           </a:p>
@@ -4414,7 +4414,7 @@
           <a:p>
             <a:fld id="{D18B56EA-E28F-4F92-9F16-7A6F2501B303}" type="datetime8">
               <a:rPr lang="en-US" smtClean="0"/>
-              <a:t>9/8/19 8:32 PM</a:t>
+              <a:t>3/4/20 9:04 PM</a:t>
             </a:fld>
             <a:endParaRPr lang="en-US" dirty="0"/>
           </a:p>
@@ -14949,7 +14949,7 @@
           <a:p>
             <a:r>
               <a:rPr lang="en-US" dirty="0"/>
-              <a:t>Build an Office add-in using React</a:t>
+              <a:t>Build an Office add-in using React </a:t>
             </a:r>
             <a:r>
               <a:rPr lang="en-US" dirty="0">
@@ -15737,13 +15737,7 @@
               <a:rPr lang="en-US" sz="1600" dirty="0">
                 <a:hlinkClick r:id="rId6"/>
               </a:rPr>
-              <a:t>https://docs.microsoft.com/en</a:t>
-            </a:r>
-            <a:r>
-              <a:rPr lang="en-US" sz="1600">
-                <a:hlinkClick r:id="rId6"/>
-              </a:rPr>
-              <a:t>-us/office/dev/add-ins/testing/sideload-office-add-ins-for-testing</a:t>
+              <a:t>https://docs.microsoft.com/en-us/office/dev/add-ins/testing/sideload-office-add-ins-for-testing</a:t>
             </a:r>
             <a:endParaRPr lang="en-US" sz="1600" dirty="0"/>
           </a:p>

</xml_diff>